<commit_message>
Modifications to slides for 2025 class
</commit_message>
<xml_diff>
--- a/optimization-methods-for-artificial-intelligence/optimization-discrete.pptx
+++ b/optimization-methods-for-artificial-intelligence/optimization-discrete.pptx
@@ -18051,8 +18051,8 @@
           </p:sp>
         </mc:Fallback>
       </mc:AlternateContent>
-      <mc:AlternateContent xmlns:mc="http://schemas.openxmlformats.org/markup-compatibility/2006" xmlns:a14="http://schemas.microsoft.com/office/drawing/2010/main">
-        <mc:Choice Requires="a14">
+      <mc:AlternateContent xmlns:mc="http://schemas.openxmlformats.org/markup-compatibility/2006">
+        <mc:Choice xmlns:a14="http://schemas.microsoft.com/office/drawing/2010/main" Requires="a14">
           <p:sp>
             <p:nvSpPr>
               <p:cNvPr id="5" name="Bulle narrative : rectangle 4">
@@ -18067,7 +18067,7 @@
             </p:nvSpPr>
             <p:spPr>
               <a:xfrm>
-                <a:off x="7122343" y="451776"/>
+                <a:off x="8313655" y="423585"/>
                 <a:ext cx="3724374" cy="1753385"/>
               </a:xfrm>
               <a:prstGeom prst="wedgeRectCallout">
@@ -18279,7 +18279,7 @@
             </p:txBody>
           </p:sp>
         </mc:Choice>
-        <mc:Fallback xmlns="">
+        <mc:Fallback>
           <p:sp>
             <p:nvSpPr>
               <p:cNvPr id="5" name="Bulle narrative : rectangle 4">
@@ -18296,7 +18296,7 @@
             </p:nvSpPr>
             <p:spPr>
               <a:xfrm>
-                <a:off x="7122343" y="451776"/>
+                <a:off x="8313655" y="423585"/>
                 <a:ext cx="3724374" cy="1753385"/>
               </a:xfrm>
               <a:prstGeom prst="wedgeRectCallout">

</xml_diff>